<commit_message>
final present and readme
</commit_message>
<xml_diff>
--- a/app_icon/Noel_Dating.pptx
+++ b/app_icon/Noel_Dating.pptx
@@ -11,9 +11,10 @@
     <p:sldId id="267" r:id="rId5"/>
     <p:sldId id="264" r:id="rId6"/>
     <p:sldId id="265" r:id="rId7"/>
-    <p:sldId id="259" r:id="rId8"/>
-    <p:sldId id="270" r:id="rId9"/>
-    <p:sldId id="269" r:id="rId10"/>
+    <p:sldId id="271" r:id="rId8"/>
+    <p:sldId id="259" r:id="rId9"/>
+    <p:sldId id="270" r:id="rId10"/>
+    <p:sldId id="269" r:id="rId11"/>
   </p:sldIdLst>
   <p:sldSz cx="9144000" cy="6858000" type="screen4x3"/>
   <p:notesSz cx="6858000" cy="9144000"/>
@@ -6163,6 +6164,95 @@
 </p:sld>
 </file>
 
+<file path=ppt/slides/slide10.xml><?xml version="1.0" encoding="utf-8"?>
+<p:sld xmlns:a="http://schemas.openxmlformats.org/drawingml/2006/main" xmlns:r="http://schemas.openxmlformats.org/officeDocument/2006/relationships" xmlns:p="http://schemas.openxmlformats.org/presentationml/2006/main">
+  <p:cSld>
+    <p:spTree>
+      <p:nvGrpSpPr>
+        <p:cNvPr id="1" name=""/>
+        <p:cNvGrpSpPr/>
+        <p:nvPr/>
+      </p:nvGrpSpPr>
+      <p:grpSpPr>
+        <a:xfrm>
+          <a:off x="0" y="0"/>
+          <a:ext cx="0" cy="0"/>
+          <a:chOff x="0" y="0"/>
+          <a:chExt cx="0" cy="0"/>
+        </a:xfrm>
+      </p:grpSpPr>
+      <p:sp>
+        <p:nvSpPr>
+          <p:cNvPr id="2" name="Title 1"/>
+          <p:cNvSpPr>
+            <a:spLocks noGrp="1"/>
+          </p:cNvSpPr>
+          <p:nvPr>
+            <p:ph type="title"/>
+          </p:nvPr>
+        </p:nvSpPr>
+        <p:spPr/>
+        <p:txBody>
+          <a:bodyPr/>
+          <a:lstStyle/>
+          <a:p>
+            <a:r>
+              <a:rPr lang="ja-JP" altLang="en-US" dirty="0" smtClean="0"/>
+              <a:t>ノエルに恋人を作ろう</a:t>
+            </a:r>
+            <a:endParaRPr lang="en-US" dirty="0"/>
+          </a:p>
+        </p:txBody>
+      </p:sp>
+      <p:pic>
+        <p:nvPicPr>
+          <p:cNvPr id="4" name="Content Placeholder 3"/>
+          <p:cNvPicPr>
+            <a:picLocks noGrp="1" noChangeAspect="1"/>
+          </p:cNvPicPr>
+          <p:nvPr>
+            <p:ph idx="1"/>
+          </p:nvPr>
+        </p:nvPicPr>
+        <p:blipFill>
+          <a:blip r:embed="rId2" cstate="print">
+            <a:extLst>
+              <a:ext uri="{28A0092B-C50C-407E-A947-70E740481C1C}">
+                <a14:useLocalDpi xmlns:a14="http://schemas.microsoft.com/office/drawing/2010/main" val="0"/>
+              </a:ext>
+            </a:extLst>
+          </a:blip>
+          <a:stretch>
+            <a:fillRect/>
+          </a:stretch>
+        </p:blipFill>
+        <p:spPr>
+          <a:xfrm>
+            <a:off x="755576" y="2060848"/>
+            <a:ext cx="5307504" cy="3744416"/>
+          </a:xfrm>
+        </p:spPr>
+      </p:pic>
+    </p:spTree>
+    <p:extLst>
+      <p:ext uri="{BB962C8B-B14F-4D97-AF65-F5344CB8AC3E}">
+        <p14:creationId xmlns:p14="http://schemas.microsoft.com/office/powerpoint/2010/main" val="858289232"/>
+      </p:ext>
+    </p:extLst>
+  </p:cSld>
+  <p:clrMapOvr>
+    <a:masterClrMapping/>
+  </p:clrMapOvr>
+  <p:timing>
+    <p:tnLst>
+      <p:par>
+        <p:cTn id="1" dur="indefinite" restart="never" nodeType="tmRoot"/>
+      </p:par>
+    </p:tnLst>
+  </p:timing>
+</p:sld>
+</file>
+
 <file path=ppt/slides/slide2.xml><?xml version="1.0" encoding="utf-8"?>
 <p:sld xmlns:a="http://schemas.openxmlformats.org/drawingml/2006/main" xmlns:r="http://schemas.openxmlformats.org/officeDocument/2006/relationships" xmlns:p="http://schemas.openxmlformats.org/presentationml/2006/main">
   <p:cSld>
@@ -6433,7 +6523,7 @@
           <a:p>
             <a:r>
               <a:rPr lang="en-US" altLang="ja-JP" dirty="0" smtClean="0"/>
-              <a:t>FACE API</a:t>
+              <a:t>API, Framework</a:t>
             </a:r>
             <a:endParaRPr kumimoji="1" lang="ja-JP" altLang="en-US" dirty="0"/>
           </a:p>
@@ -6452,7 +6542,7 @@
         <p:spPr/>
         <p:txBody>
           <a:bodyPr>
-            <a:normAutofit/>
+            <a:normAutofit lnSpcReduction="10000"/>
           </a:bodyPr>
           <a:lstStyle/>
           <a:p>
@@ -6482,16 +6572,67 @@
             </a:r>
             <a:r>
               <a:rPr lang="ja-JP" altLang="en-US" sz="2800" dirty="0" smtClean="0"/>
-              <a:t>出す。</a:t>
-            </a:r>
-            <a:endParaRPr lang="en-US" altLang="ja-JP" sz="2800" dirty="0" smtClean="0"/>
-          </a:p>
-          <a:p>
+              <a:t>出す</a:t>
+            </a:r>
             <a:r>
               <a:rPr lang="ja-JP" altLang="en-US" sz="2800" dirty="0" smtClean="0"/>
-              <a:t>その結果で本アプリを使っている人々から捜査して似合っている人また相応しい相手を推薦する</a:t>
-            </a:r>
-            <a:endParaRPr lang="en-US" altLang="ja-JP" sz="2800" dirty="0" smtClean="0"/>
+              <a:t>。</a:t>
+            </a:r>
+            <a:r>
+              <a:rPr lang="ja-JP" altLang="en-US" sz="2800" dirty="0" smtClean="0"/>
+              <a:t>その</a:t>
+            </a:r>
+            <a:r>
+              <a:rPr lang="ja-JP" altLang="en-US" sz="2800" dirty="0" smtClean="0"/>
+              <a:t>結果で本アプリを使っている</a:t>
+            </a:r>
+            <a:r>
+              <a:rPr lang="ja-JP" altLang="en-US" sz="2800" dirty="0"/>
+              <a:t>人々</a:t>
+            </a:r>
+            <a:r>
+              <a:rPr lang="ja-JP" altLang="en-US" sz="2800" dirty="0" smtClean="0"/>
+              <a:t>から捜査して似合っている人</a:t>
+            </a:r>
+            <a:r>
+              <a:rPr lang="ja-JP" altLang="en-US" sz="2800" dirty="0" smtClean="0"/>
+              <a:t>また</a:t>
+            </a:r>
+            <a:r>
+              <a:rPr lang="ja-JP" altLang="en-US" sz="2800" dirty="0" smtClean="0"/>
+              <a:t>相応しい相手を推薦</a:t>
+            </a:r>
+            <a:r>
+              <a:rPr lang="ja-JP" altLang="en-US" sz="2800" dirty="0" smtClean="0"/>
+              <a:t>する</a:t>
+            </a:r>
+            <a:r>
+              <a:rPr lang="ja-JP" altLang="en-US" sz="2800" dirty="0" smtClean="0"/>
+              <a:t>。</a:t>
+            </a:r>
+          </a:p>
+          <a:p>
+            <a:r>
+              <a:rPr lang="en-US" sz="2800" dirty="0" err="1"/>
+              <a:t>Multipeer</a:t>
+            </a:r>
+            <a:r>
+              <a:rPr lang="en-US" sz="2800" dirty="0"/>
+              <a:t> Connectivity は、</a:t>
+            </a:r>
+            <a:r>
+              <a:rPr lang="en-US" sz="2800" dirty="0"/>
+              <a:t>複数台での擬似的なP2P</a:t>
+            </a:r>
+            <a:r>
+              <a:rPr lang="en-US" sz="2800" dirty="0"/>
+              <a:t>通信を行うための仕組み</a:t>
+            </a:r>
+            <a:r>
+              <a:rPr lang="ja-JP" altLang="en-US" sz="2800" dirty="0"/>
+              <a:t>である。</a:t>
+            </a:r>
+            <a:endParaRPr lang="en-US" altLang="ja-JP" sz="2800" dirty="0"/>
           </a:p>
         </p:txBody>
       </p:sp>
@@ -6694,6 +6835,95 @@
 </file>
 
 <file path=ppt/slides/slide7.xml><?xml version="1.0" encoding="utf-8"?>
+<p:sld xmlns:a="http://schemas.openxmlformats.org/drawingml/2006/main" xmlns:r="http://schemas.openxmlformats.org/officeDocument/2006/relationships" xmlns:p="http://schemas.openxmlformats.org/presentationml/2006/main">
+  <p:cSld>
+    <p:spTree>
+      <p:nvGrpSpPr>
+        <p:cNvPr id="1" name=""/>
+        <p:cNvGrpSpPr/>
+        <p:nvPr/>
+      </p:nvGrpSpPr>
+      <p:grpSpPr>
+        <a:xfrm>
+          <a:off x="0" y="0"/>
+          <a:ext cx="0" cy="0"/>
+          <a:chOff x="0" y="0"/>
+          <a:chExt cx="0" cy="0"/>
+        </a:xfrm>
+      </p:grpSpPr>
+      <p:sp>
+        <p:nvSpPr>
+          <p:cNvPr id="2" name="タイトル 1"/>
+          <p:cNvSpPr>
+            <a:spLocks noGrp="1"/>
+          </p:cNvSpPr>
+          <p:nvPr>
+            <p:ph type="title"/>
+          </p:nvPr>
+        </p:nvSpPr>
+        <p:spPr/>
+        <p:txBody>
+          <a:bodyPr/>
+          <a:lstStyle/>
+          <a:p>
+            <a:r>
+              <a:rPr kumimoji="1" lang="ja-JP" altLang="en-US" dirty="0" smtClean="0"/>
+              <a:t>チャンネルでチャット</a:t>
+            </a:r>
+            <a:endParaRPr kumimoji="1" lang="ja-JP" altLang="en-US" dirty="0"/>
+          </a:p>
+        </p:txBody>
+      </p:sp>
+      <p:pic>
+        <p:nvPicPr>
+          <p:cNvPr id="5" name="Content Placeholder 4"/>
+          <p:cNvPicPr>
+            <a:picLocks noGrp="1" noChangeAspect="1"/>
+          </p:cNvPicPr>
+          <p:nvPr>
+            <p:ph idx="1"/>
+          </p:nvPr>
+        </p:nvPicPr>
+        <p:blipFill>
+          <a:blip r:embed="rId2">
+            <a:extLst>
+              <a:ext uri="{28A0092B-C50C-407E-A947-70E740481C1C}">
+                <a14:useLocalDpi xmlns:a14="http://schemas.microsoft.com/office/drawing/2010/main" val="0"/>
+              </a:ext>
+            </a:extLst>
+          </a:blip>
+          <a:stretch>
+            <a:fillRect/>
+          </a:stretch>
+        </p:blipFill>
+        <p:spPr>
+          <a:xfrm>
+            <a:off x="1835696" y="1269523"/>
+            <a:ext cx="3600400" cy="5588477"/>
+          </a:xfrm>
+        </p:spPr>
+      </p:pic>
+    </p:spTree>
+    <p:extLst>
+      <p:ext uri="{BB962C8B-B14F-4D97-AF65-F5344CB8AC3E}">
+        <p14:creationId xmlns:p14="http://schemas.microsoft.com/office/powerpoint/2010/main" val="758204781"/>
+      </p:ext>
+    </p:extLst>
+  </p:cSld>
+  <p:clrMapOvr>
+    <a:masterClrMapping/>
+  </p:clrMapOvr>
+  <p:timing>
+    <p:tnLst>
+      <p:par>
+        <p:cTn id="1" dur="indefinite" restart="never" nodeType="tmRoot"/>
+      </p:par>
+    </p:tnLst>
+  </p:timing>
+</p:sld>
+</file>
+
+<file path=ppt/slides/slide8.xml><?xml version="1.0" encoding="utf-8"?>
 <p:sld xmlns:a="http://schemas.openxmlformats.org/drawingml/2006/main" xmlns:r="http://schemas.openxmlformats.org/officeDocument/2006/relationships" xmlns:p="http://schemas.openxmlformats.org/presentationml/2006/main">
   <p:cSld>
     <p:spTree>
@@ -6815,7 +7045,7 @@
 </p:sld>
 </file>
 
-<file path=ppt/slides/slide8.xml><?xml version="1.0" encoding="utf-8"?>
+<file path=ppt/slides/slide9.xml><?xml version="1.0" encoding="utf-8"?>
 <p:sld xmlns:a="http://schemas.openxmlformats.org/drawingml/2006/main" xmlns:r="http://schemas.openxmlformats.org/officeDocument/2006/relationships" xmlns:p="http://schemas.openxmlformats.org/presentationml/2006/main">
   <p:cSld>
     <p:spTree>
@@ -6888,95 +7118,6 @@
     <p:extLst>
       <p:ext uri="{BB962C8B-B14F-4D97-AF65-F5344CB8AC3E}">
         <p14:creationId xmlns:p14="http://schemas.microsoft.com/office/powerpoint/2010/main" val="1012395393"/>
-      </p:ext>
-    </p:extLst>
-  </p:cSld>
-  <p:clrMapOvr>
-    <a:masterClrMapping/>
-  </p:clrMapOvr>
-  <p:timing>
-    <p:tnLst>
-      <p:par>
-        <p:cTn id="1" dur="indefinite" restart="never" nodeType="tmRoot"/>
-      </p:par>
-    </p:tnLst>
-  </p:timing>
-</p:sld>
-</file>
-
-<file path=ppt/slides/slide9.xml><?xml version="1.0" encoding="utf-8"?>
-<p:sld xmlns:a="http://schemas.openxmlformats.org/drawingml/2006/main" xmlns:r="http://schemas.openxmlformats.org/officeDocument/2006/relationships" xmlns:p="http://schemas.openxmlformats.org/presentationml/2006/main">
-  <p:cSld>
-    <p:spTree>
-      <p:nvGrpSpPr>
-        <p:cNvPr id="1" name=""/>
-        <p:cNvGrpSpPr/>
-        <p:nvPr/>
-      </p:nvGrpSpPr>
-      <p:grpSpPr>
-        <a:xfrm>
-          <a:off x="0" y="0"/>
-          <a:ext cx="0" cy="0"/>
-          <a:chOff x="0" y="0"/>
-          <a:chExt cx="0" cy="0"/>
-        </a:xfrm>
-      </p:grpSpPr>
-      <p:sp>
-        <p:nvSpPr>
-          <p:cNvPr id="2" name="Title 1"/>
-          <p:cNvSpPr>
-            <a:spLocks noGrp="1"/>
-          </p:cNvSpPr>
-          <p:nvPr>
-            <p:ph type="title"/>
-          </p:nvPr>
-        </p:nvSpPr>
-        <p:spPr/>
-        <p:txBody>
-          <a:bodyPr/>
-          <a:lstStyle/>
-          <a:p>
-            <a:r>
-              <a:rPr lang="ja-JP" altLang="en-US" dirty="0" smtClean="0"/>
-              <a:t>ノエルに恋人を作ろう</a:t>
-            </a:r>
-            <a:endParaRPr lang="en-US" dirty="0"/>
-          </a:p>
-        </p:txBody>
-      </p:sp>
-      <p:pic>
-        <p:nvPicPr>
-          <p:cNvPr id="4" name="Content Placeholder 3"/>
-          <p:cNvPicPr>
-            <a:picLocks noGrp="1" noChangeAspect="1"/>
-          </p:cNvPicPr>
-          <p:nvPr>
-            <p:ph idx="1"/>
-          </p:nvPr>
-        </p:nvPicPr>
-        <p:blipFill>
-          <a:blip r:embed="rId2" cstate="print">
-            <a:extLst>
-              <a:ext uri="{28A0092B-C50C-407E-A947-70E740481C1C}">
-                <a14:useLocalDpi xmlns:a14="http://schemas.microsoft.com/office/drawing/2010/main" val="0"/>
-              </a:ext>
-            </a:extLst>
-          </a:blip>
-          <a:stretch>
-            <a:fillRect/>
-          </a:stretch>
-        </p:blipFill>
-        <p:spPr>
-          <a:xfrm>
-            <a:off x="755576" y="2060848"/>
-            <a:ext cx="5307504" cy="3744416"/>
-          </a:xfrm>
-        </p:spPr>
-      </p:pic>
-    </p:spTree>
-    <p:extLst>
-      <p:ext uri="{BB962C8B-B14F-4D97-AF65-F5344CB8AC3E}">
-        <p14:creationId xmlns:p14="http://schemas.microsoft.com/office/powerpoint/2010/main" val="858289232"/>
       </p:ext>
     </p:extLst>
   </p:cSld>

</xml_diff>

<commit_message>
update image for presentation
</commit_message>
<xml_diff>
--- a/app_icon/Noel_Dating.pptx
+++ b/app_icon/Noel_Dating.pptx
@@ -9,12 +9,13 @@
     <p:sldId id="266" r:id="rId3"/>
     <p:sldId id="268" r:id="rId4"/>
     <p:sldId id="267" r:id="rId5"/>
-    <p:sldId id="264" r:id="rId6"/>
-    <p:sldId id="265" r:id="rId7"/>
-    <p:sldId id="271" r:id="rId8"/>
-    <p:sldId id="259" r:id="rId9"/>
-    <p:sldId id="270" r:id="rId10"/>
-    <p:sldId id="269" r:id="rId11"/>
+    <p:sldId id="272" r:id="rId6"/>
+    <p:sldId id="264" r:id="rId7"/>
+    <p:sldId id="265" r:id="rId8"/>
+    <p:sldId id="271" r:id="rId9"/>
+    <p:sldId id="259" r:id="rId10"/>
+    <p:sldId id="270" r:id="rId11"/>
+    <p:sldId id="269" r:id="rId12"/>
   </p:sldIdLst>
   <p:sldSz cx="9144000" cy="6858000" type="screen4x3"/>
   <p:notesSz cx="6858000" cy="9144000"/>
@@ -6198,6 +6199,95 @@
           <a:p>
             <a:r>
               <a:rPr lang="ja-JP" altLang="en-US" dirty="0" smtClean="0"/>
+              <a:t>データベース図</a:t>
+            </a:r>
+            <a:endParaRPr lang="en-US" dirty="0"/>
+          </a:p>
+        </p:txBody>
+      </p:sp>
+      <p:pic>
+        <p:nvPicPr>
+          <p:cNvPr id="4" name="Content Placeholder 3"/>
+          <p:cNvPicPr>
+            <a:picLocks noGrp="1" noChangeAspect="1"/>
+          </p:cNvPicPr>
+          <p:nvPr>
+            <p:ph idx="1"/>
+          </p:nvPr>
+        </p:nvPicPr>
+        <p:blipFill>
+          <a:blip r:embed="rId2">
+            <a:extLst>
+              <a:ext uri="{28A0092B-C50C-407E-A947-70E740481C1C}">
+                <a14:useLocalDpi xmlns:a14="http://schemas.microsoft.com/office/drawing/2010/main" val="0"/>
+              </a:ext>
+            </a:extLst>
+          </a:blip>
+          <a:stretch>
+            <a:fillRect/>
+          </a:stretch>
+        </p:blipFill>
+        <p:spPr>
+          <a:xfrm>
+            <a:off x="1115616" y="1600200"/>
+            <a:ext cx="6120680" cy="4525963"/>
+          </a:xfrm>
+        </p:spPr>
+      </p:pic>
+    </p:spTree>
+    <p:extLst>
+      <p:ext uri="{BB962C8B-B14F-4D97-AF65-F5344CB8AC3E}">
+        <p14:creationId xmlns:p14="http://schemas.microsoft.com/office/powerpoint/2010/main" val="1012395393"/>
+      </p:ext>
+    </p:extLst>
+  </p:cSld>
+  <p:clrMapOvr>
+    <a:masterClrMapping/>
+  </p:clrMapOvr>
+  <p:timing>
+    <p:tnLst>
+      <p:par>
+        <p:cTn id="1" dur="indefinite" restart="never" nodeType="tmRoot"/>
+      </p:par>
+    </p:tnLst>
+  </p:timing>
+</p:sld>
+</file>
+
+<file path=ppt/slides/slide11.xml><?xml version="1.0" encoding="utf-8"?>
+<p:sld xmlns:a="http://schemas.openxmlformats.org/drawingml/2006/main" xmlns:r="http://schemas.openxmlformats.org/officeDocument/2006/relationships" xmlns:p="http://schemas.openxmlformats.org/presentationml/2006/main">
+  <p:cSld>
+    <p:spTree>
+      <p:nvGrpSpPr>
+        <p:cNvPr id="1" name=""/>
+        <p:cNvGrpSpPr/>
+        <p:nvPr/>
+      </p:nvGrpSpPr>
+      <p:grpSpPr>
+        <a:xfrm>
+          <a:off x="0" y="0"/>
+          <a:ext cx="0" cy="0"/>
+          <a:chOff x="0" y="0"/>
+          <a:chExt cx="0" cy="0"/>
+        </a:xfrm>
+      </p:grpSpPr>
+      <p:sp>
+        <p:nvSpPr>
+          <p:cNvPr id="2" name="Title 1"/>
+          <p:cNvSpPr>
+            <a:spLocks noGrp="1"/>
+          </p:cNvSpPr>
+          <p:nvPr>
+            <p:ph type="title"/>
+          </p:nvPr>
+        </p:nvSpPr>
+        <p:spPr/>
+        <p:txBody>
+          <a:bodyPr/>
+          <a:lstStyle/>
+          <a:p>
+            <a:r>
+              <a:rPr lang="ja-JP" altLang="en-US" dirty="0" smtClean="0"/>
               <a:t>ノエルに恋人を作ろう</a:t>
             </a:r>
             <a:endParaRPr lang="en-US" dirty="0"/>
@@ -6349,8 +6439,16 @@
           </a:p>
           <a:p>
             <a:r>
+              <a:rPr lang="ja-JP" altLang="en-US" sz="2800" dirty="0" smtClean="0"/>
+              <a:t>クリスマス</a:t>
+            </a:r>
+            <a:r>
+              <a:rPr lang="ja-JP" altLang="en-US" sz="2800" dirty="0" smtClean="0"/>
+              <a:t>に</a:t>
+            </a:r>
+            <a:r>
               <a:rPr lang="ja-JP" altLang="en-US" sz="2800" dirty="0"/>
-              <a:t>ノエルに向けて、周り人々に楽しみに遊び出会って、付き合ってるチャンスを高める。</a:t>
+              <a:t>向けて、周り人々に楽しみに遊び出会って、付き合ってるチャンスを高める。</a:t>
             </a:r>
             <a:endParaRPr lang="en-US" altLang="ja-JP" sz="2800" dirty="0" smtClean="0"/>
           </a:p>
@@ -6572,19 +6670,7 @@
             </a:r>
             <a:r>
               <a:rPr lang="ja-JP" altLang="en-US" sz="2800" dirty="0" smtClean="0"/>
-              <a:t>出す</a:t>
-            </a:r>
-            <a:r>
-              <a:rPr lang="ja-JP" altLang="en-US" sz="2800" dirty="0" smtClean="0"/>
-              <a:t>。</a:t>
-            </a:r>
-            <a:r>
-              <a:rPr lang="ja-JP" altLang="en-US" sz="2800" dirty="0" smtClean="0"/>
-              <a:t>その</a:t>
-            </a:r>
-            <a:r>
-              <a:rPr lang="ja-JP" altLang="en-US" sz="2800" dirty="0" smtClean="0"/>
-              <a:t>結果で本アプリを使っている</a:t>
+              <a:t>出す。その結果で本アプリを使っている</a:t>
             </a:r>
             <a:r>
               <a:rPr lang="ja-JP" altLang="en-US" sz="2800" dirty="0"/>
@@ -6592,23 +6678,7 @@
             </a:r>
             <a:r>
               <a:rPr lang="ja-JP" altLang="en-US" sz="2800" dirty="0" smtClean="0"/>
-              <a:t>から捜査して似合っている人</a:t>
-            </a:r>
-            <a:r>
-              <a:rPr lang="ja-JP" altLang="en-US" sz="2800" dirty="0" smtClean="0"/>
-              <a:t>また</a:t>
-            </a:r>
-            <a:r>
-              <a:rPr lang="ja-JP" altLang="en-US" sz="2800" dirty="0" smtClean="0"/>
-              <a:t>相応しい相手を推薦</a:t>
-            </a:r>
-            <a:r>
-              <a:rPr lang="ja-JP" altLang="en-US" sz="2800" dirty="0" smtClean="0"/>
-              <a:t>する</a:t>
-            </a:r>
-            <a:r>
-              <a:rPr lang="ja-JP" altLang="en-US" sz="2800" dirty="0" smtClean="0"/>
-              <a:t>。</a:t>
+              <a:t>から捜査して似合っている人また相応しい相手を推薦する。</a:t>
             </a:r>
           </a:p>
           <a:p>
@@ -6618,15 +6688,7 @@
             </a:r>
             <a:r>
               <a:rPr lang="en-US" sz="2800" dirty="0"/>
-              <a:t> Connectivity は、</a:t>
-            </a:r>
-            <a:r>
-              <a:rPr lang="en-US" sz="2800" dirty="0"/>
-              <a:t>複数台での擬似的なP2P</a:t>
-            </a:r>
-            <a:r>
-              <a:rPr lang="en-US" sz="2800" dirty="0"/>
-              <a:t>通信を行うための仕組み</a:t>
+              <a:t> Connectivity は、複数台での擬似的なP2P通信を行うための仕組み</a:t>
             </a:r>
             <a:r>
               <a:rPr lang="ja-JP" altLang="en-US" sz="2800" dirty="0"/>
@@ -6675,7 +6737,7 @@
       </p:grpSpPr>
       <p:sp>
         <p:nvSpPr>
-          <p:cNvPr id="2" name="タイトル 1"/>
+          <p:cNvPr id="2" name="Title 1"/>
           <p:cNvSpPr>
             <a:spLocks noGrp="1"/>
           </p:cNvSpPr>
@@ -6689,22 +6751,102 @@
           <a:lstStyle/>
           <a:p>
             <a:r>
-              <a:rPr kumimoji="1" lang="ja-JP" altLang="en-US" dirty="0" smtClean="0"/>
-              <a:t>二人デート</a:t>
-            </a:r>
-            <a:endParaRPr kumimoji="1" lang="ja-JP" altLang="en-US" dirty="0"/>
+              <a:rPr lang="en-US" dirty="0" smtClean="0"/>
+              <a:t>Face detection</a:t>
+            </a:r>
+            <a:endParaRPr lang="en-US" dirty="0"/>
           </a:p>
         </p:txBody>
       </p:sp>
       <p:pic>
         <p:nvPicPr>
-          <p:cNvPr id="6" name="Content Placeholder 5"/>
+          <p:cNvPr id="4" name="Content Placeholder 3"/>
           <p:cNvPicPr>
             <a:picLocks noGrp="1" noChangeAspect="1"/>
           </p:cNvPicPr>
           <p:nvPr>
             <p:ph idx="1"/>
           </p:nvPr>
+        </p:nvPicPr>
+        <p:blipFill>
+          <a:blip r:embed="rId2" cstate="print">
+            <a:extLst>
+              <a:ext uri="{28A0092B-C50C-407E-A947-70E740481C1C}">
+                <a14:useLocalDpi xmlns:a14="http://schemas.microsoft.com/office/drawing/2010/main" val="0"/>
+              </a:ext>
+            </a:extLst>
+          </a:blip>
+          <a:stretch>
+            <a:fillRect/>
+          </a:stretch>
+        </p:blipFill>
+        <p:spPr>
+          <a:xfrm>
+            <a:off x="2411760" y="1270000"/>
+            <a:ext cx="2959422" cy="5263826"/>
+          </a:xfrm>
+        </p:spPr>
+      </p:pic>
+    </p:spTree>
+    <p:extLst>
+      <p:ext uri="{BB962C8B-B14F-4D97-AF65-F5344CB8AC3E}">
+        <p14:creationId xmlns:p14="http://schemas.microsoft.com/office/powerpoint/2010/main" val="50882631"/>
+      </p:ext>
+    </p:extLst>
+  </p:cSld>
+  <p:clrMapOvr>
+    <a:masterClrMapping/>
+  </p:clrMapOvr>
+</p:sld>
+</file>
+
+<file path=ppt/slides/slide6.xml><?xml version="1.0" encoding="utf-8"?>
+<p:sld xmlns:a="http://schemas.openxmlformats.org/drawingml/2006/main" xmlns:r="http://schemas.openxmlformats.org/officeDocument/2006/relationships" xmlns:p="http://schemas.openxmlformats.org/presentationml/2006/main">
+  <p:cSld>
+    <p:spTree>
+      <p:nvGrpSpPr>
+        <p:cNvPr id="1" name=""/>
+        <p:cNvGrpSpPr/>
+        <p:nvPr/>
+      </p:nvGrpSpPr>
+      <p:grpSpPr>
+        <a:xfrm>
+          <a:off x="0" y="0"/>
+          <a:ext cx="0" cy="0"/>
+          <a:chOff x="0" y="0"/>
+          <a:chExt cx="0" cy="0"/>
+        </a:xfrm>
+      </p:grpSpPr>
+      <p:sp>
+        <p:nvSpPr>
+          <p:cNvPr id="2" name="タイトル 1"/>
+          <p:cNvSpPr>
+            <a:spLocks noGrp="1"/>
+          </p:cNvSpPr>
+          <p:nvPr>
+            <p:ph type="title"/>
+          </p:nvPr>
+        </p:nvSpPr>
+        <p:spPr/>
+        <p:txBody>
+          <a:bodyPr/>
+          <a:lstStyle/>
+          <a:p>
+            <a:r>
+              <a:rPr kumimoji="1" lang="ja-JP" altLang="en-US" dirty="0" smtClean="0"/>
+              <a:t>二人デート</a:t>
+            </a:r>
+            <a:endParaRPr kumimoji="1" lang="ja-JP" altLang="en-US" dirty="0"/>
+          </a:p>
+        </p:txBody>
+      </p:sp>
+      <p:pic>
+        <p:nvPicPr>
+          <p:cNvPr id="5" name="Picture 4"/>
+          <p:cNvPicPr>
+            <a:picLocks noChangeAspect="1"/>
+          </p:cNvPicPr>
+          <p:nvPr/>
         </p:nvPicPr>
         <p:blipFill>
           <a:blip r:embed="rId2">
@@ -6720,8 +6862,40 @@
         </p:blipFill>
         <p:spPr>
           <a:xfrm>
-            <a:off x="1461383" y="2160588"/>
-            <a:ext cx="4644847" cy="3881437"/>
+            <a:off x="4211960" y="1637335"/>
+            <a:ext cx="2599680" cy="4758036"/>
+          </a:xfrm>
+          <a:prstGeom prst="rect">
+            <a:avLst/>
+          </a:prstGeom>
+        </p:spPr>
+      </p:pic>
+      <p:pic>
+        <p:nvPicPr>
+          <p:cNvPr id="8" name="Content Placeholder 7"/>
+          <p:cNvPicPr>
+            <a:picLocks noGrp="1" noChangeAspect="1"/>
+          </p:cNvPicPr>
+          <p:nvPr>
+            <p:ph idx="1"/>
+          </p:nvPr>
+        </p:nvPicPr>
+        <p:blipFill>
+          <a:blip r:embed="rId3" cstate="print">
+            <a:extLst>
+              <a:ext uri="{28A0092B-C50C-407E-A947-70E740481C1C}">
+                <a14:useLocalDpi xmlns:a14="http://schemas.microsoft.com/office/drawing/2010/main" val="0"/>
+              </a:ext>
+            </a:extLst>
+          </a:blip>
+          <a:stretch>
+            <a:fillRect/>
+          </a:stretch>
+        </p:blipFill>
+        <p:spPr>
+          <a:xfrm>
+            <a:off x="827584" y="1675658"/>
+            <a:ext cx="2520280" cy="4482738"/>
           </a:xfrm>
         </p:spPr>
       </p:pic>
@@ -6745,7 +6919,7 @@
 </p:sld>
 </file>
 
-<file path=ppt/slides/slide6.xml><?xml version="1.0" encoding="utf-8"?>
+<file path=ppt/slides/slide7.xml><?xml version="1.0" encoding="utf-8"?>
 <p:sld xmlns:a="http://schemas.openxmlformats.org/drawingml/2006/main" xmlns:r="http://schemas.openxmlformats.org/officeDocument/2006/relationships" xmlns:p="http://schemas.openxmlformats.org/presentationml/2006/main">
   <p:cSld>
     <p:spTree>
@@ -6834,7 +7008,7 @@
 </p:sld>
 </file>
 
-<file path=ppt/slides/slide7.xml><?xml version="1.0" encoding="utf-8"?>
+<file path=ppt/slides/slide8.xml><?xml version="1.0" encoding="utf-8"?>
 <p:sld xmlns:a="http://schemas.openxmlformats.org/drawingml/2006/main" xmlns:r="http://schemas.openxmlformats.org/officeDocument/2006/relationships" xmlns:p="http://schemas.openxmlformats.org/presentationml/2006/main">
   <p:cSld>
     <p:spTree>
@@ -6923,7 +7097,7 @@
 </p:sld>
 </file>
 
-<file path=ppt/slides/slide8.xml><?xml version="1.0" encoding="utf-8"?>
+<file path=ppt/slides/slide9.xml><?xml version="1.0" encoding="utf-8"?>
 <p:sld xmlns:a="http://schemas.openxmlformats.org/drawingml/2006/main" xmlns:r="http://schemas.openxmlformats.org/officeDocument/2006/relationships" xmlns:p="http://schemas.openxmlformats.org/presentationml/2006/main">
   <p:cSld>
     <p:spTree>
@@ -7029,95 +7203,6 @@
     <p:extLst>
       <p:ext uri="{BB962C8B-B14F-4D97-AF65-F5344CB8AC3E}">
         <p14:creationId xmlns:p14="http://schemas.microsoft.com/office/powerpoint/2010/main" val="2574660564"/>
-      </p:ext>
-    </p:extLst>
-  </p:cSld>
-  <p:clrMapOvr>
-    <a:masterClrMapping/>
-  </p:clrMapOvr>
-  <p:timing>
-    <p:tnLst>
-      <p:par>
-        <p:cTn id="1" dur="indefinite" restart="never" nodeType="tmRoot"/>
-      </p:par>
-    </p:tnLst>
-  </p:timing>
-</p:sld>
-</file>
-
-<file path=ppt/slides/slide9.xml><?xml version="1.0" encoding="utf-8"?>
-<p:sld xmlns:a="http://schemas.openxmlformats.org/drawingml/2006/main" xmlns:r="http://schemas.openxmlformats.org/officeDocument/2006/relationships" xmlns:p="http://schemas.openxmlformats.org/presentationml/2006/main">
-  <p:cSld>
-    <p:spTree>
-      <p:nvGrpSpPr>
-        <p:cNvPr id="1" name=""/>
-        <p:cNvGrpSpPr/>
-        <p:nvPr/>
-      </p:nvGrpSpPr>
-      <p:grpSpPr>
-        <a:xfrm>
-          <a:off x="0" y="0"/>
-          <a:ext cx="0" cy="0"/>
-          <a:chOff x="0" y="0"/>
-          <a:chExt cx="0" cy="0"/>
-        </a:xfrm>
-      </p:grpSpPr>
-      <p:sp>
-        <p:nvSpPr>
-          <p:cNvPr id="2" name="Title 1"/>
-          <p:cNvSpPr>
-            <a:spLocks noGrp="1"/>
-          </p:cNvSpPr>
-          <p:nvPr>
-            <p:ph type="title"/>
-          </p:nvPr>
-        </p:nvSpPr>
-        <p:spPr/>
-        <p:txBody>
-          <a:bodyPr/>
-          <a:lstStyle/>
-          <a:p>
-            <a:r>
-              <a:rPr lang="ja-JP" altLang="en-US" dirty="0" smtClean="0"/>
-              <a:t>データベース図</a:t>
-            </a:r>
-            <a:endParaRPr lang="en-US" dirty="0"/>
-          </a:p>
-        </p:txBody>
-      </p:sp>
-      <p:pic>
-        <p:nvPicPr>
-          <p:cNvPr id="4" name="Content Placeholder 3"/>
-          <p:cNvPicPr>
-            <a:picLocks noGrp="1" noChangeAspect="1"/>
-          </p:cNvPicPr>
-          <p:nvPr>
-            <p:ph idx="1"/>
-          </p:nvPr>
-        </p:nvPicPr>
-        <p:blipFill>
-          <a:blip r:embed="rId2">
-            <a:extLst>
-              <a:ext uri="{28A0092B-C50C-407E-A947-70E740481C1C}">
-                <a14:useLocalDpi xmlns:a14="http://schemas.microsoft.com/office/drawing/2010/main" val="0"/>
-              </a:ext>
-            </a:extLst>
-          </a:blip>
-          <a:stretch>
-            <a:fillRect/>
-          </a:stretch>
-        </p:blipFill>
-        <p:spPr>
-          <a:xfrm>
-            <a:off x="1115616" y="1600200"/>
-            <a:ext cx="6120680" cy="4525963"/>
-          </a:xfrm>
-        </p:spPr>
-      </p:pic>
-    </p:spTree>
-    <p:extLst>
-      <p:ext uri="{BB962C8B-B14F-4D97-AF65-F5344CB8AC3E}">
-        <p14:creationId xmlns:p14="http://schemas.microsoft.com/office/powerpoint/2010/main" val="1012395393"/>
       </p:ext>
     </p:extLst>
   </p:cSld>

</xml_diff>